<commit_message>
Uploading Semester Project Pitch
</commit_message>
<xml_diff>
--- a/Semester Project/Docs/LindleyElevatorPitch.pptx
+++ b/Semester Project/Docs/LindleyElevatorPitch.pptx
@@ -6324,8 +6324,8 @@
         </p:nvSpPr>
         <p:spPr>
           <a:xfrm>
-            <a:off x="204620" y="2863827"/>
-            <a:ext cx="3920018" cy="1015663"/>
+            <a:off x="204620" y="2886751"/>
+            <a:ext cx="3920018" cy="1200329"/>
           </a:xfrm>
           <a:prstGeom prst="rect">
             <a:avLst/>
@@ -6340,15 +6340,7 @@
           <a:p>
             <a:r>
               <a:rPr lang="en-US" sz="1200" dirty="0"/>
-              <a:t>My proposed gameplay is a round-based </a:t>
-            </a:r>
-            <a:r>
-              <a:rPr lang="en-US" sz="1200" dirty="0" err="1"/>
-              <a:t>firest</a:t>
-            </a:r>
-            <a:r>
-              <a:rPr lang="en-US" sz="1200" dirty="0"/>
-              <a:t>-person action game where players are to defend an abandoned sacred shrine from yokai. The area will be in the yard of the shrine where evil yokai will spawn on the edge of the map and work themselves inwards towards the shrine. </a:t>
+              <a:t>My proposed gameplay is a round-based first-person action game where players are to defend an abandoned sacred shrine from yokai. The area will be in the yard of the shrine where evil yokai will spawn on the edge of the map and work themselves inwards towards the shrine. </a:t>
             </a:r>
           </a:p>
         </p:txBody>

</xml_diff>

<commit_message>
Uploading Semester Project Pitch updated
</commit_message>
<xml_diff>
--- a/Semester Project/Docs/LindleyElevatorPitch.pptx
+++ b/Semester Project/Docs/LindleyElevatorPitch.pptx
@@ -298,7 +298,7 @@
           <a:p>
             <a:fld id="{E80C50CD-E178-4744-9B35-B2F624D6C5E9}" type="datetimeFigureOut">
               <a:rPr lang="en-US" smtClean="0"/>
-              <a:t>9/7/2025</a:t>
+              <a:t>9/10/2025</a:t>
             </a:fld>
             <a:endParaRPr lang="en-US"/>
           </a:p>
@@ -574,7 +574,7 @@
             <a:fld id="{E80C50CD-E178-4744-9B35-B2F624D6C5E9}" type="datetimeFigureOut">
               <a:rPr lang="en-US" smtClean="0"/>
               <a:pPr/>
-              <a:t>9/7/2025</a:t>
+              <a:t>9/10/2025</a:t>
             </a:fld>
             <a:endParaRPr lang="en-US"/>
           </a:p>
@@ -770,7 +770,7 @@
             <a:fld id="{E80C50CD-E178-4744-9B35-B2F624D6C5E9}" type="datetimeFigureOut">
               <a:rPr lang="en-US" smtClean="0"/>
               <a:pPr/>
-              <a:t>9/7/2025</a:t>
+              <a:t>9/10/2025</a:t>
             </a:fld>
             <a:endParaRPr lang="en-US"/>
           </a:p>
@@ -1045,7 +1045,7 @@
             <a:fld id="{E80C50CD-E178-4744-9B35-B2F624D6C5E9}" type="datetimeFigureOut">
               <a:rPr lang="en-US" smtClean="0"/>
               <a:pPr/>
-              <a:t>9/7/2025</a:t>
+              <a:t>9/10/2025</a:t>
             </a:fld>
             <a:endParaRPr lang="en-US"/>
           </a:p>
@@ -1388,7 +1388,7 @@
             <a:fld id="{E80C50CD-E178-4744-9B35-B2F624D6C5E9}" type="datetimeFigureOut">
               <a:rPr lang="en-US" smtClean="0"/>
               <a:pPr/>
-              <a:t>9/7/2025</a:t>
+              <a:t>9/10/2025</a:t>
             </a:fld>
             <a:endParaRPr lang="en-US"/>
           </a:p>
@@ -2013,7 +2013,7 @@
             <a:fld id="{E80C50CD-E178-4744-9B35-B2F624D6C5E9}" type="datetimeFigureOut">
               <a:rPr lang="en-US" smtClean="0"/>
               <a:pPr/>
-              <a:t>9/7/2025</a:t>
+              <a:t>9/10/2025</a:t>
             </a:fld>
             <a:endParaRPr lang="en-US"/>
           </a:p>
@@ -2875,7 +2875,7 @@
             <a:fld id="{E80C50CD-E178-4744-9B35-B2F624D6C5E9}" type="datetimeFigureOut">
               <a:rPr lang="en-US" smtClean="0"/>
               <a:pPr/>
-              <a:t>9/7/2025</a:t>
+              <a:t>9/10/2025</a:t>
             </a:fld>
             <a:endParaRPr lang="en-US"/>
           </a:p>
@@ -3046,7 +3046,7 @@
           <a:p>
             <a:fld id="{E80C50CD-E178-4744-9B35-B2F624D6C5E9}" type="datetimeFigureOut">
               <a:rPr lang="en-US" smtClean="0"/>
-              <a:t>9/7/2025</a:t>
+              <a:t>9/10/2025</a:t>
             </a:fld>
             <a:endParaRPr lang="en-US"/>
           </a:p>
@@ -3226,7 +3226,7 @@
           <a:p>
             <a:fld id="{E80C50CD-E178-4744-9B35-B2F624D6C5E9}" type="datetimeFigureOut">
               <a:rPr lang="en-US" smtClean="0"/>
-              <a:t>9/7/2025</a:t>
+              <a:t>9/10/2025</a:t>
             </a:fld>
             <a:endParaRPr lang="en-US"/>
           </a:p>
@@ -3396,7 +3396,7 @@
           <a:p>
             <a:fld id="{E80C50CD-E178-4744-9B35-B2F624D6C5E9}" type="datetimeFigureOut">
               <a:rPr lang="en-US" smtClean="0"/>
-              <a:t>9/7/2025</a:t>
+              <a:t>9/10/2025</a:t>
             </a:fld>
             <a:endParaRPr lang="en-US"/>
           </a:p>
@@ -3643,7 +3643,7 @@
           <a:p>
             <a:fld id="{E80C50CD-E178-4744-9B35-B2F624D6C5E9}" type="datetimeFigureOut">
               <a:rPr lang="en-US" smtClean="0"/>
-              <a:t>9/7/2025</a:t>
+              <a:t>9/10/2025</a:t>
             </a:fld>
             <a:endParaRPr lang="en-US"/>
           </a:p>
@@ -3935,7 +3935,7 @@
           <a:p>
             <a:fld id="{E80C50CD-E178-4744-9B35-B2F624D6C5E9}" type="datetimeFigureOut">
               <a:rPr lang="en-US" smtClean="0"/>
-              <a:t>9/7/2025</a:t>
+              <a:t>9/10/2025</a:t>
             </a:fld>
             <a:endParaRPr lang="en-US"/>
           </a:p>
@@ -4379,7 +4379,7 @@
           <a:p>
             <a:fld id="{E80C50CD-E178-4744-9B35-B2F624D6C5E9}" type="datetimeFigureOut">
               <a:rPr lang="en-US" smtClean="0"/>
-              <a:t>9/7/2025</a:t>
+              <a:t>9/10/2025</a:t>
             </a:fld>
             <a:endParaRPr lang="en-US"/>
           </a:p>
@@ -4497,7 +4497,7 @@
           <a:p>
             <a:fld id="{E80C50CD-E178-4744-9B35-B2F624D6C5E9}" type="datetimeFigureOut">
               <a:rPr lang="en-US" smtClean="0"/>
-              <a:t>9/7/2025</a:t>
+              <a:t>9/10/2025</a:t>
             </a:fld>
             <a:endParaRPr lang="en-US"/>
           </a:p>
@@ -4592,7 +4592,7 @@
           <a:p>
             <a:fld id="{E80C50CD-E178-4744-9B35-B2F624D6C5E9}" type="datetimeFigureOut">
               <a:rPr lang="en-US" smtClean="0"/>
-              <a:t>9/7/2025</a:t>
+              <a:t>9/10/2025</a:t>
             </a:fld>
             <a:endParaRPr lang="en-US"/>
           </a:p>
@@ -4871,7 +4871,7 @@
           <a:p>
             <a:fld id="{E80C50CD-E178-4744-9B35-B2F624D6C5E9}" type="datetimeFigureOut">
               <a:rPr lang="en-US" smtClean="0"/>
-              <a:t>9/7/2025</a:t>
+              <a:t>9/10/2025</a:t>
             </a:fld>
             <a:endParaRPr lang="en-US"/>
           </a:p>
@@ -5146,7 +5146,7 @@
           <a:p>
             <a:fld id="{E80C50CD-E178-4744-9B35-B2F624D6C5E9}" type="datetimeFigureOut">
               <a:rPr lang="en-US" smtClean="0"/>
-              <a:t>9/7/2025</a:t>
+              <a:t>9/10/2025</a:t>
             </a:fld>
             <a:endParaRPr lang="en-US"/>
           </a:p>
@@ -5576,7 +5576,7 @@
             <a:fld id="{E80C50CD-E178-4744-9B35-B2F624D6C5E9}" type="datetimeFigureOut">
               <a:rPr lang="en-US" smtClean="0"/>
               <a:pPr/>
-              <a:t>9/7/2025</a:t>
+              <a:t>9/10/2025</a:t>
             </a:fld>
             <a:endParaRPr lang="en-US"/>
           </a:p>
@@ -6131,7 +6131,7 @@
         </p:nvSpPr>
         <p:spPr>
           <a:xfrm>
-            <a:off x="0" y="323936"/>
+            <a:off x="0" y="106255"/>
             <a:ext cx="5143500" cy="818606"/>
           </a:xfrm>
         </p:spPr>
@@ -6199,8 +6199,8 @@
         </p:blipFill>
         <p:spPr>
           <a:xfrm>
-            <a:off x="5043540" y="0"/>
-            <a:ext cx="2740064" cy="3131503"/>
+            <a:off x="43639" y="2949137"/>
+            <a:ext cx="3085746" cy="3526568"/>
           </a:xfrm>
           <a:prstGeom prst="rect">
             <a:avLst/>
@@ -6221,8 +6221,8 @@
         </p:nvSpPr>
         <p:spPr>
           <a:xfrm>
-            <a:off x="167868" y="1217433"/>
-            <a:ext cx="4240530" cy="1015663"/>
+            <a:off x="30713" y="1346670"/>
+            <a:ext cx="4240530" cy="1384995"/>
           </a:xfrm>
           <a:prstGeom prst="rect">
             <a:avLst/>
@@ -6236,7 +6236,7 @@
           <a:lstStyle/>
           <a:p>
             <a:r>
-              <a:rPr lang="en-US" sz="1200" dirty="0">
+              <a:rPr lang="en-US" sz="1400" dirty="0">
                 <a:solidFill>
                   <a:schemeClr val="tx2"/>
                 </a:solidFill>
@@ -6244,7 +6244,7 @@
               <a:t>You are playing as Princess </a:t>
             </a:r>
             <a:r>
-              <a:rPr lang="en-US" sz="1200" dirty="0" err="1">
+              <a:rPr lang="en-US" sz="1400" dirty="0" err="1">
                 <a:solidFill>
                   <a:schemeClr val="tx2"/>
                 </a:solidFill>
@@ -6252,31 +6252,15 @@
               <a:t>Yamatohime</a:t>
             </a:r>
             <a:r>
-              <a:rPr lang="en-US" sz="1200" dirty="0">
+              <a:rPr lang="en-US" sz="1400" dirty="0">
                 <a:solidFill>
                   <a:schemeClr val="tx2"/>
                 </a:solidFill>
               </a:rPr>
-              <a:t>-no-Mikoto defending </a:t>
-            </a:r>
-            <a:r>
-              <a:rPr lang="en-US" sz="1200">
-                <a:solidFill>
-                  <a:schemeClr val="tx2"/>
-                </a:solidFill>
-              </a:rPr>
-              <a:t>and rebuilding an </a:t>
-            </a:r>
-            <a:r>
-              <a:rPr lang="en-US" sz="1200" dirty="0">
-                <a:solidFill>
-                  <a:schemeClr val="tx2"/>
-                </a:solidFill>
-              </a:rPr>
-              <a:t>abandoned shrine from waves of evil yokai using the legendary Kusanagi no </a:t>
-            </a:r>
-            <a:r>
-              <a:rPr lang="en-US" sz="1200" dirty="0" err="1">
+              <a:t>-no-Mikoto, defending and reglorify an abandoned shrine from waves of evil yokai using the legendary Kusanagi no </a:t>
+            </a:r>
+            <a:r>
+              <a:rPr lang="en-US" sz="1400" dirty="0" err="1">
                 <a:solidFill>
                   <a:schemeClr val="tx2"/>
                 </a:solidFill>
@@ -6284,7 +6268,7 @@
               <a:t>Tsurugi</a:t>
             </a:r>
             <a:r>
-              <a:rPr lang="en-US" sz="1200" dirty="0">
+              <a:rPr lang="en-US" sz="1400" dirty="0">
                 <a:solidFill>
                   <a:schemeClr val="tx2"/>
                 </a:solidFill>
@@ -6292,7 +6276,7 @@
               <a:t> and divine powers granted to her by Amaterasu </a:t>
             </a:r>
             <a:r>
-              <a:rPr lang="en-US" sz="1200" dirty="0" err="1">
+              <a:rPr lang="en-US" sz="1400" dirty="0" err="1">
                 <a:solidFill>
                   <a:schemeClr val="tx2"/>
                 </a:solidFill>
@@ -6300,12 +6284,12 @@
               <a:t>Ōmikami</a:t>
             </a:r>
             <a:r>
-              <a:rPr lang="en-US" sz="1200" dirty="0">
+              <a:rPr lang="en-US" sz="1400" dirty="0">
                 <a:solidFill>
                   <a:schemeClr val="tx2"/>
                 </a:solidFill>
               </a:rPr>
-              <a:t> (goddess of the Sun). </a:t>
+              <a:t> (Shinto goddess of the Sun). </a:t>
             </a:r>
           </a:p>
         </p:txBody>
@@ -6324,8 +6308,8 @@
         </p:nvSpPr>
         <p:spPr>
           <a:xfrm>
-            <a:off x="204620" y="2886751"/>
-            <a:ext cx="3920018" cy="1200329"/>
+            <a:off x="4013821" y="1364702"/>
+            <a:ext cx="3906495" cy="1631216"/>
           </a:xfrm>
           <a:prstGeom prst="rect">
             <a:avLst/>
@@ -6339,8 +6323,16 @@
           <a:lstStyle/>
           <a:p>
             <a:r>
-              <a:rPr lang="en-US" sz="1200" dirty="0"/>
-              <a:t>My proposed gameplay is a round-based first-person action game where players are to defend an abandoned sacred shrine from yokai. The area will be in the yard of the shrine where evil yokai will spawn on the edge of the map and work themselves inwards towards the shrine. </a:t>
+              <a:rPr lang="en-US" sz="1400" dirty="0"/>
+              <a:t>My proposed gameplay is a round-based first-person action game where players are to defend an abandoned </a:t>
+            </a:r>
+            <a:r>
+              <a:rPr lang="en-US" sz="1400"/>
+              <a:t>shrine from evil </a:t>
+            </a:r>
+            <a:r>
+              <a:rPr lang="en-US" sz="1400" dirty="0"/>
+              <a:t>yokai. The setting will be in the shrine's yard, where evil yokai will emerge from the map's edges and make their way toward the shrine.</a:t>
             </a:r>
           </a:p>
         </p:txBody>
@@ -6359,7 +6351,7 @@
         </p:nvSpPr>
         <p:spPr>
           <a:xfrm>
-            <a:off x="240449" y="4191535"/>
+            <a:off x="7889603" y="761135"/>
             <a:ext cx="2930932" cy="1077218"/>
           </a:xfrm>
           <a:prstGeom prst="rect">
@@ -6464,8 +6456,8 @@
         </p:nvSpPr>
         <p:spPr>
           <a:xfrm>
-            <a:off x="240449" y="4736052"/>
-            <a:ext cx="3411830" cy="1384995"/>
+            <a:off x="7920316" y="1268283"/>
+            <a:ext cx="3225218" cy="2123658"/>
           </a:xfrm>
           <a:prstGeom prst="rect">
             <a:avLst/>
@@ -6494,7 +6486,7 @@
             </a:pPr>
             <a:r>
               <a:rPr lang="en-US" sz="1200" dirty="0"/>
-              <a:t>Waves of diverse evil yokai enemies with increasing difficulty per round.</a:t>
+              <a:t>Waves of evil yokai enemies.</a:t>
             </a:r>
           </a:p>
           <a:p>
@@ -6504,7 +6496,7 @@
             </a:pPr>
             <a:r>
               <a:rPr lang="en-US" sz="1200" dirty="0"/>
-              <a:t>Gifting buffs from Benevolent Yokai granting unique abilities. </a:t>
+              <a:t>Gifted buffs from good Yokai granting unique abilities. Like: Health regen.</a:t>
             </a:r>
           </a:p>
           <a:p>
@@ -6520,7 +6512,20 @@
               <a:rPr lang="en-US" sz="1200" dirty="0" err="1"/>
               <a:t>Ōmikami</a:t>
             </a:r>
-            <a:endParaRPr lang="en-US" sz="1200" dirty="0"/>
+            <a:r>
+              <a:rPr lang="en-US" sz="1200" dirty="0"/>
+              <a:t>. : Meaning Damage Buff or Flame related Abilities. </a:t>
+            </a:r>
+          </a:p>
+          <a:p>
+            <a:pPr marL="285750" indent="-285750">
+              <a:buFont typeface="Arial" panose="020B0604020202020204" pitchFamily="34" charset="0"/>
+              <a:buChar char="•"/>
+            </a:pPr>
+            <a:r>
+              <a:rPr lang="en-US" sz="1200" dirty="0"/>
+              <a:t>Unlockable Weapons. Like: Gohei, and Hama Yumi (bow). </a:t>
+            </a:r>
           </a:p>
         </p:txBody>
       </p:sp>
@@ -6538,7 +6543,7 @@
         </p:nvSpPr>
         <p:spPr>
           <a:xfrm>
-            <a:off x="204620" y="2307987"/>
+            <a:off x="3983108" y="896520"/>
             <a:ext cx="2930932" cy="1077218"/>
           </a:xfrm>
           <a:prstGeom prst="rect">
@@ -6643,7 +6648,7 @@
         </p:nvSpPr>
         <p:spPr>
           <a:xfrm>
-            <a:off x="167868" y="736953"/>
+            <a:off x="0" y="849592"/>
             <a:ext cx="2930932" cy="1077218"/>
           </a:xfrm>
           <a:prstGeom prst="rect">
@@ -6762,7 +6767,7 @@
         </p:blipFill>
         <p:spPr>
           <a:xfrm>
-            <a:off x="6678852" y="3765393"/>
+            <a:off x="6713142" y="3770374"/>
             <a:ext cx="5345280" cy="3006720"/>
           </a:xfrm>
           <a:prstGeom prst="rect">
@@ -6784,7 +6789,7 @@
         </p:nvSpPr>
         <p:spPr>
           <a:xfrm>
-            <a:off x="8140702" y="1094322"/>
+            <a:off x="3129385" y="3655928"/>
             <a:ext cx="3883430" cy="892552"/>
           </a:xfrm>
           <a:prstGeom prst="rect">
@@ -6831,8 +6836,8 @@
         </p:nvSpPr>
         <p:spPr bwMode="auto">
           <a:xfrm>
-            <a:off x="8227506" y="1540598"/>
-            <a:ext cx="3759201" cy="1200329"/>
+            <a:off x="3148791" y="4216650"/>
+            <a:ext cx="3459528" cy="1384995"/>
           </a:xfrm>
           <a:prstGeom prst="rect">
             <a:avLst/>
@@ -6845,7 +6850,7 @@
           </a:bodyPr>
           <a:lstStyle/>
           <a:p>
-            <a:endParaRPr lang="en-US" altLang="en-US" sz="1200" dirty="0">
+            <a:endParaRPr lang="en-US" altLang="en-US" sz="1400" dirty="0">
               <a:solidFill>
                 <a:schemeClr val="tx2"/>
               </a:solidFill>
@@ -6853,16 +6858,16 @@
           </a:p>
           <a:p>
             <a:r>
-              <a:rPr lang="en-US" altLang="en-US" sz="1200" dirty="0">
+              <a:rPr lang="en-US" altLang="en-US" sz="1400" dirty="0">
                 <a:solidFill>
                   <a:schemeClr val="tx2"/>
                 </a:solidFill>
               </a:rPr>
-              <a:t>Focused on a single map, modular enemy waves, and scalable abilities is the scope of the project, and I would believe that it will fit semester timeline. </a:t>
-            </a:r>
-          </a:p>
-          <a:p>
-            <a:endParaRPr lang="en-US" altLang="en-US" sz="1200" dirty="0">
+              <a:t>Focused on a single map, tower defense type of enemy waves, and simple abilities is the scope of the project.</a:t>
+            </a:r>
+          </a:p>
+          <a:p>
+            <a:endParaRPr lang="en-US" altLang="en-US" sz="1400" dirty="0">
               <a:solidFill>
                 <a:schemeClr val="tx2"/>
               </a:solidFill>
@@ -6884,7 +6889,7 @@
         </p:nvSpPr>
         <p:spPr>
           <a:xfrm>
-            <a:off x="5077895" y="3162980"/>
+            <a:off x="167868" y="6521802"/>
             <a:ext cx="2881260" cy="323936"/>
           </a:xfrm>
           <a:prstGeom prst="rect">
@@ -6999,7 +7004,7 @@
         </p:nvSpPr>
         <p:spPr>
           <a:xfrm>
-            <a:off x="6756660" y="3357353"/>
+            <a:off x="6870960" y="3324098"/>
             <a:ext cx="5676640" cy="892552"/>
           </a:xfrm>
           <a:prstGeom prst="rect">
@@ -7089,6 +7094,41 @@
                 <a:cs typeface="Cascadia Code" panose="020B0609020000020004" pitchFamily="49" charset="0"/>
               </a:rPr>
               <a:t>Sample of the ideal game play</a:t>
+            </a:r>
+          </a:p>
+        </p:txBody>
+      </p:sp>
+      <p:sp>
+        <p:nvSpPr>
+          <p:cNvPr id="3" name="TextBox 2">
+            <a:extLst>
+              <a:ext uri="{FF2B5EF4-FFF2-40B4-BE49-F238E27FC236}">
+                <a16:creationId xmlns:a16="http://schemas.microsoft.com/office/drawing/2014/main" id="{25E4814D-409A-FF45-EE41-357985E076D1}"/>
+              </a:ext>
+            </a:extLst>
+          </p:cNvPr>
+          <p:cNvSpPr txBox="1"/>
+          <p:nvPr/>
+        </p:nvSpPr>
+        <p:spPr>
+          <a:xfrm>
+            <a:off x="4942655" y="6105414"/>
+            <a:ext cx="1770487" cy="646331"/>
+          </a:xfrm>
+          <a:prstGeom prst="rect">
+            <a:avLst/>
+          </a:prstGeom>
+          <a:noFill/>
+        </p:spPr>
+        <p:txBody>
+          <a:bodyPr wrap="square" rtlCol="0">
+            <a:spAutoFit/>
+          </a:bodyPr>
+          <a:lstStyle/>
+          <a:p>
+            <a:r>
+              <a:rPr lang="en-US" dirty="0"/>
+              <a:t> WANTED: Yokai Uprising.</a:t>
             </a:r>
           </a:p>
         </p:txBody>

</xml_diff>

<commit_message>
Uploading Semester Project Pitch updated version 2
</commit_message>
<xml_diff>
--- a/Semester Project/Docs/LindleyElevatorPitch.pptx
+++ b/Semester Project/Docs/LindleyElevatorPitch.pptx
@@ -6142,7 +6142,7 @@
           <a:lstStyle/>
           <a:p>
             <a:r>
-              <a:rPr lang="en-US" sz="3200" b="1" dirty="0" err="1">
+              <a:rPr lang="en-US" sz="3200" b="1" dirty="0">
                 <a:latin typeface="Bauhaus 93" panose="04030905020B02020C02" pitchFamily="82" charset="0"/>
               </a:rPr>
               <a:t>Yamatohime</a:t>
@@ -6241,55 +6241,7 @@
                   <a:schemeClr val="tx2"/>
                 </a:solidFill>
               </a:rPr>
-              <a:t>You are playing as Princess </a:t>
-            </a:r>
-            <a:r>
-              <a:rPr lang="en-US" sz="1400" dirty="0" err="1">
-                <a:solidFill>
-                  <a:schemeClr val="tx2"/>
-                </a:solidFill>
-              </a:rPr>
-              <a:t>Yamatohime</a:t>
-            </a:r>
-            <a:r>
-              <a:rPr lang="en-US" sz="1400" dirty="0">
-                <a:solidFill>
-                  <a:schemeClr val="tx2"/>
-                </a:solidFill>
-              </a:rPr>
-              <a:t>-no-Mikoto, defending and reglorify an abandoned shrine from waves of evil yokai using the legendary Kusanagi no </a:t>
-            </a:r>
-            <a:r>
-              <a:rPr lang="en-US" sz="1400" dirty="0" err="1">
-                <a:solidFill>
-                  <a:schemeClr val="tx2"/>
-                </a:solidFill>
-              </a:rPr>
-              <a:t>Tsurugi</a:t>
-            </a:r>
-            <a:r>
-              <a:rPr lang="en-US" sz="1400" dirty="0">
-                <a:solidFill>
-                  <a:schemeClr val="tx2"/>
-                </a:solidFill>
-              </a:rPr>
-              <a:t> and divine powers granted to her by Amaterasu </a:t>
-            </a:r>
-            <a:r>
-              <a:rPr lang="en-US" sz="1400" dirty="0" err="1">
-                <a:solidFill>
-                  <a:schemeClr val="tx2"/>
-                </a:solidFill>
-              </a:rPr>
-              <a:t>Ōmikami</a:t>
-            </a:r>
-            <a:r>
-              <a:rPr lang="en-US" sz="1400" dirty="0">
-                <a:solidFill>
-                  <a:schemeClr val="tx2"/>
-                </a:solidFill>
-              </a:rPr>
-              <a:t> (Shinto goddess of the Sun). </a:t>
+              <a:t>You are playing as Princess Yamatohime-no-Mikoto, defending and reglorify an abandoned shrine from waves of evil yokai using the legendary Kusanagi no Tsurugi and divine powers granted to her by Amaterasu Ōmikami (Shinto goddess of the Sun). </a:t>
             </a:r>
           </a:p>
         </p:txBody>
@@ -6351,7 +6303,7 @@
         </p:nvSpPr>
         <p:spPr>
           <a:xfrm>
-            <a:off x="7889603" y="761135"/>
+            <a:off x="7632181" y="191065"/>
             <a:ext cx="2930932" cy="1077218"/>
           </a:xfrm>
           <a:prstGeom prst="rect">
@@ -6456,7 +6408,7 @@
         </p:nvSpPr>
         <p:spPr>
           <a:xfrm>
-            <a:off x="7920316" y="1268283"/>
+            <a:off x="7773173" y="674636"/>
             <a:ext cx="3225218" cy="2123658"/>
           </a:xfrm>
           <a:prstGeom prst="rect">
@@ -6506,15 +6458,7 @@
             </a:pPr>
             <a:r>
               <a:rPr lang="en-US" sz="1200" dirty="0"/>
-              <a:t>Unlockable divine flame powers from goddess Amaterasu </a:t>
-            </a:r>
-            <a:r>
-              <a:rPr lang="en-US" sz="1200" dirty="0" err="1"/>
-              <a:t>Ōmikami</a:t>
-            </a:r>
-            <a:r>
-              <a:rPr lang="en-US" sz="1200" dirty="0"/>
-              <a:t>. : Meaning Damage Buff or Flame related Abilities. </a:t>
+              <a:t>Unlockable divine flame powers from goddess Amaterasu Ōmikami. : Meaning Damage Buff or Flame related Abilities. </a:t>
             </a:r>
           </a:p>
           <a:p>
@@ -6767,7 +6711,7 @@
         </p:blipFill>
         <p:spPr>
           <a:xfrm>
-            <a:off x="6713142" y="3770374"/>
+            <a:off x="6713142" y="3177258"/>
             <a:ext cx="5345280" cy="3006720"/>
           </a:xfrm>
           <a:prstGeom prst="rect">
@@ -6775,106 +6719,6 @@
           </a:prstGeom>
         </p:spPr>
       </p:pic>
-      <p:sp>
-        <p:nvSpPr>
-          <p:cNvPr id="23" name="TextBox 22">
-            <a:extLst>
-              <a:ext uri="{FF2B5EF4-FFF2-40B4-BE49-F238E27FC236}">
-                <a16:creationId xmlns:a16="http://schemas.microsoft.com/office/drawing/2014/main" id="{11A3B623-A3BD-7D9D-5F92-B1184DBE515D}"/>
-              </a:ext>
-            </a:extLst>
-          </p:cNvPr>
-          <p:cNvSpPr txBox="1"/>
-          <p:nvPr/>
-        </p:nvSpPr>
-        <p:spPr>
-          <a:xfrm>
-            <a:off x="3129385" y="3655928"/>
-            <a:ext cx="3883430" cy="892552"/>
-          </a:xfrm>
-          <a:prstGeom prst="rect">
-            <a:avLst/>
-          </a:prstGeom>
-          <a:noFill/>
-        </p:spPr>
-        <p:txBody>
-          <a:bodyPr wrap="square" rtlCol="0">
-            <a:spAutoFit/>
-          </a:bodyPr>
-          <a:lstStyle/>
-          <a:p>
-            <a:r>
-              <a:rPr lang="en-US" sz="2000" b="1" dirty="0">
-                <a:solidFill>
-                  <a:schemeClr val="tx2"/>
-                </a:solidFill>
-                <a:latin typeface="Bauhaus 93" panose="04030905020B02020C02" pitchFamily="82" charset="0"/>
-                <a:ea typeface="+mj-ea"/>
-                <a:cs typeface="+mj-cs"/>
-              </a:rPr>
-              <a:t>Why I believe It’s a good Starting Point:</a:t>
-            </a:r>
-          </a:p>
-          <a:p>
-            <a:endParaRPr lang="en-US" sz="1200" dirty="0"/>
-          </a:p>
-        </p:txBody>
-      </p:sp>
-      <p:sp>
-        <p:nvSpPr>
-          <p:cNvPr id="28" name="Rectangle 3">
-            <a:extLst>
-              <a:ext uri="{FF2B5EF4-FFF2-40B4-BE49-F238E27FC236}">
-                <a16:creationId xmlns:a16="http://schemas.microsoft.com/office/drawing/2014/main" id="{240B799B-57B6-B09C-5F97-5502E5299F15}"/>
-              </a:ext>
-            </a:extLst>
-          </p:cNvPr>
-          <p:cNvSpPr>
-            <a:spLocks noChangeArrowheads="1"/>
-          </p:cNvSpPr>
-          <p:nvPr/>
-        </p:nvSpPr>
-        <p:spPr bwMode="auto">
-          <a:xfrm>
-            <a:off x="3148791" y="4216650"/>
-            <a:ext cx="3459528" cy="1384995"/>
-          </a:xfrm>
-          <a:prstGeom prst="rect">
-            <a:avLst/>
-          </a:prstGeom>
-          <a:noFill/>
-        </p:spPr>
-        <p:txBody>
-          <a:bodyPr wrap="square" rtlCol="0">
-            <a:spAutoFit/>
-          </a:bodyPr>
-          <a:lstStyle/>
-          <a:p>
-            <a:endParaRPr lang="en-US" altLang="en-US" sz="1400" dirty="0">
-              <a:solidFill>
-                <a:schemeClr val="tx2"/>
-              </a:solidFill>
-            </a:endParaRPr>
-          </a:p>
-          <a:p>
-            <a:r>
-              <a:rPr lang="en-US" altLang="en-US" sz="1400" dirty="0">
-                <a:solidFill>
-                  <a:schemeClr val="tx2"/>
-                </a:solidFill>
-              </a:rPr>
-              <a:t>Focused on a single map, tower defense type of enemy waves, and simple abilities is the scope of the project.</a:t>
-            </a:r>
-          </a:p>
-          <a:p>
-            <a:endParaRPr lang="en-US" altLang="en-US" sz="1400" dirty="0">
-              <a:solidFill>
-                <a:schemeClr val="tx2"/>
-              </a:solidFill>
-            </a:endParaRPr>
-          </a:p>
-        </p:txBody>
-      </p:sp>
       <p:sp>
         <p:nvSpPr>
           <p:cNvPr id="29" name="TextBox 28">
@@ -7004,7 +6848,7 @@
         </p:nvSpPr>
         <p:spPr>
           <a:xfrm>
-            <a:off x="6870960" y="3324098"/>
+            <a:off x="6621034" y="2730982"/>
             <a:ext cx="5676640" cy="892552"/>
           </a:xfrm>
           <a:prstGeom prst="rect">
@@ -7112,8 +6956,8 @@
         </p:nvSpPr>
         <p:spPr>
           <a:xfrm>
-            <a:off x="4942655" y="6105414"/>
-            <a:ext cx="1770487" cy="646331"/>
+            <a:off x="8122369" y="6180652"/>
+            <a:ext cx="3085746" cy="369332"/>
           </a:xfrm>
           <a:prstGeom prst="rect">
             <a:avLst/>
@@ -7129,6 +6973,77 @@
             <a:r>
               <a:rPr lang="en-US" dirty="0"/>
               <a:t> WANTED: Yokai Uprising.</a:t>
+            </a:r>
+          </a:p>
+        </p:txBody>
+      </p:sp>
+      <p:pic>
+        <p:nvPicPr>
+          <p:cNvPr id="8" name="Picture 7" descr="A cartoon character with a red and white cone hat and eyes&#10;&#10;AI-generated content may be incorrect.">
+            <a:extLst>
+              <a:ext uri="{FF2B5EF4-FFF2-40B4-BE49-F238E27FC236}">
+                <a16:creationId xmlns:a16="http://schemas.microsoft.com/office/drawing/2014/main" id="{1D78CE63-005E-574D-EC2F-D5D4E06A35EC}"/>
+              </a:ext>
+            </a:extLst>
+          </p:cNvPr>
+          <p:cNvPicPr>
+            <a:picLocks noChangeAspect="1"/>
+          </p:cNvPicPr>
+          <p:nvPr/>
+        </p:nvPicPr>
+        <p:blipFill>
+          <a:blip r:embed="rId4">
+            <a:extLst>
+              <a:ext uri="{28A0092B-C50C-407E-A947-70E740481C1C}">
+                <a14:useLocalDpi xmlns:a14="http://schemas.microsoft.com/office/drawing/2010/main" val="0"/>
+              </a:ext>
+            </a:extLst>
+          </a:blip>
+          <a:stretch>
+            <a:fillRect/>
+          </a:stretch>
+        </p:blipFill>
+        <p:spPr>
+          <a:xfrm>
+            <a:off x="3573251" y="2949137"/>
+            <a:ext cx="2296675" cy="3150306"/>
+          </a:xfrm>
+          <a:prstGeom prst="rect">
+            <a:avLst/>
+          </a:prstGeom>
+        </p:spPr>
+      </p:pic>
+      <p:sp>
+        <p:nvSpPr>
+          <p:cNvPr id="10" name="TextBox 9">
+            <a:extLst>
+              <a:ext uri="{FF2B5EF4-FFF2-40B4-BE49-F238E27FC236}">
+                <a16:creationId xmlns:a16="http://schemas.microsoft.com/office/drawing/2014/main" id="{11FDEC50-4B49-FA01-6254-BC1CDFAA71DD}"/>
+              </a:ext>
+            </a:extLst>
+          </p:cNvPr>
+          <p:cNvSpPr txBox="1"/>
+          <p:nvPr/>
+        </p:nvSpPr>
+        <p:spPr>
+          <a:xfrm>
+            <a:off x="3573251" y="6180652"/>
+            <a:ext cx="2522749" cy="369332"/>
+          </a:xfrm>
+          <a:prstGeom prst="rect">
+            <a:avLst/>
+          </a:prstGeom>
+          <a:noFill/>
+        </p:spPr>
+        <p:txBody>
+          <a:bodyPr wrap="square" rtlCol="0">
+            <a:spAutoFit/>
+          </a:bodyPr>
+          <a:lstStyle/>
+          <a:p>
+            <a:r>
+              <a:rPr lang="en-US" dirty="0"/>
+              <a:t>Example of a Yokai</a:t>
             </a:r>
           </a:p>
         </p:txBody>

</xml_diff>

<commit_message>
Uploading Semester Project Pitch updated version 3
</commit_message>
<xml_diff>
--- a/Semester Project/Docs/LindleyElevatorPitch.pptx
+++ b/Semester Project/Docs/LindleyElevatorPitch.pptx
@@ -7027,8 +7027,8 @@
         </p:nvSpPr>
         <p:spPr>
           <a:xfrm>
-            <a:off x="3573251" y="6180652"/>
-            <a:ext cx="2522749" cy="369332"/>
+            <a:off x="3480633" y="6198636"/>
+            <a:ext cx="2881260" cy="646331"/>
           </a:xfrm>
           <a:prstGeom prst="rect">
             <a:avLst/>
@@ -7044,6 +7044,20 @@
             <a:r>
               <a:rPr lang="en-US" dirty="0"/>
               <a:t>Example of a Yokai</a:t>
+            </a:r>
+          </a:p>
+          <a:p>
+            <a:r>
+              <a:rPr lang="en-US" dirty="0"/>
+              <a:t>(Named Kasa-</a:t>
+            </a:r>
+            <a:r>
+              <a:rPr lang="en-US" dirty="0" err="1"/>
+              <a:t>obake</a:t>
+            </a:r>
+            <a:r>
+              <a:rPr lang="en-US" dirty="0"/>
+              <a:t>)</a:t>
             </a:r>
           </a:p>
         </p:txBody>

</xml_diff>